<commit_message>
Adding new stack frame pics
</commit_message>
<xml_diff>
--- a/presentation.pptx
+++ b/presentation.pptx
@@ -5,7 +5,7 @@
     <p:sldMasterId id="2147483648" r:id="rId1"/>
   </p:sldMasterIdLst>
   <p:notesMasterIdLst>
-    <p:notesMasterId r:id="rId33"/>
+    <p:notesMasterId r:id="rId35"/>
   </p:notesMasterIdLst>
   <p:sldIdLst>
     <p:sldId id="256" r:id="rId2"/>
@@ -32,13 +32,15 @@
     <p:sldId id="291" r:id="rId23"/>
     <p:sldId id="292" r:id="rId24"/>
     <p:sldId id="293" r:id="rId25"/>
-    <p:sldId id="279" r:id="rId26"/>
-    <p:sldId id="297" r:id="rId27"/>
-    <p:sldId id="298" r:id="rId28"/>
-    <p:sldId id="299" r:id="rId29"/>
-    <p:sldId id="300" r:id="rId30"/>
-    <p:sldId id="280" r:id="rId31"/>
-    <p:sldId id="295" r:id="rId32"/>
+    <p:sldId id="302" r:id="rId26"/>
+    <p:sldId id="303" r:id="rId27"/>
+    <p:sldId id="279" r:id="rId28"/>
+    <p:sldId id="297" r:id="rId29"/>
+    <p:sldId id="298" r:id="rId30"/>
+    <p:sldId id="299" r:id="rId31"/>
+    <p:sldId id="300" r:id="rId32"/>
+    <p:sldId id="280" r:id="rId33"/>
+    <p:sldId id="295" r:id="rId34"/>
   </p:sldIdLst>
   <p:sldSz cx="9144000" cy="6858000" type="screen4x3"/>
   <p:notesSz cx="6858000" cy="9144000"/>
@@ -222,7 +224,7 @@
           <a:p>
             <a:fld id="{1276CDAF-28B4-7E45-A69E-2DC163EF97CF}" type="datetimeFigureOut">
               <a:rPr lang="en-US" smtClean="0"/>
-              <a:t>25/04/14</a:t>
+              <a:t>30/04/14</a:t>
             </a:fld>
             <a:endParaRPr lang="en-US"/>
           </a:p>
@@ -880,7 +882,7 @@
           <a:p>
             <a:fld id="{5D74FDC0-35D8-F34C-B228-DA42CBAF1130}" type="slidenum">
               <a:rPr lang="en-US" smtClean="0"/>
-              <a:t>29</a:t>
+              <a:t>31</a:t>
             </a:fld>
             <a:endParaRPr lang="en-US"/>
           </a:p>
@@ -2138,7 +2140,7 @@
           <a:p>
             <a:fld id="{6BFECD78-3C8E-49F2-8FAB-59489D168ABB}" type="datetimeFigureOut">
               <a:rPr lang="en-US" smtClean="0"/>
-              <a:t>25/04/14</a:t>
+              <a:t>30/04/14</a:t>
             </a:fld>
             <a:endParaRPr lang="en-US"/>
           </a:p>
@@ -2308,7 +2310,7 @@
           <a:p>
             <a:fld id="{6BFECD78-3C8E-49F2-8FAB-59489D168ABB}" type="datetimeFigureOut">
               <a:rPr lang="en-US" smtClean="0"/>
-              <a:t>25/04/14</a:t>
+              <a:t>30/04/14</a:t>
             </a:fld>
             <a:endParaRPr lang="en-US"/>
           </a:p>
@@ -2488,7 +2490,7 @@
           <a:p>
             <a:fld id="{6BFECD78-3C8E-49F2-8FAB-59489D168ABB}" type="datetimeFigureOut">
               <a:rPr lang="en-US" smtClean="0"/>
-              <a:t>25/04/14</a:t>
+              <a:t>30/04/14</a:t>
             </a:fld>
             <a:endParaRPr lang="en-US"/>
           </a:p>
@@ -2658,7 +2660,7 @@
           <a:p>
             <a:fld id="{6BFECD78-3C8E-49F2-8FAB-59489D168ABB}" type="datetimeFigureOut">
               <a:rPr lang="en-US" smtClean="0"/>
-              <a:t>25/04/14</a:t>
+              <a:t>30/04/14</a:t>
             </a:fld>
             <a:endParaRPr lang="en-US"/>
           </a:p>
@@ -2904,7 +2906,7 @@
           <a:p>
             <a:fld id="{6BFECD78-3C8E-49F2-8FAB-59489D168ABB}" type="datetimeFigureOut">
               <a:rPr lang="en-US" smtClean="0"/>
-              <a:t>25/04/14</a:t>
+              <a:t>30/04/14</a:t>
             </a:fld>
             <a:endParaRPr lang="en-US"/>
           </a:p>
@@ -3192,7 +3194,7 @@
           <a:p>
             <a:fld id="{6BFECD78-3C8E-49F2-8FAB-59489D168ABB}" type="datetimeFigureOut">
               <a:rPr lang="en-US" smtClean="0"/>
-              <a:t>25/04/14</a:t>
+              <a:t>30/04/14</a:t>
             </a:fld>
             <a:endParaRPr lang="en-US"/>
           </a:p>
@@ -3614,7 +3616,7 @@
           <a:p>
             <a:fld id="{6BFECD78-3C8E-49F2-8FAB-59489D168ABB}" type="datetimeFigureOut">
               <a:rPr lang="en-US" smtClean="0"/>
-              <a:t>25/04/14</a:t>
+              <a:t>30/04/14</a:t>
             </a:fld>
             <a:endParaRPr lang="en-US"/>
           </a:p>
@@ -3732,7 +3734,7 @@
           <a:p>
             <a:fld id="{6BFECD78-3C8E-49F2-8FAB-59489D168ABB}" type="datetimeFigureOut">
               <a:rPr lang="en-US" smtClean="0"/>
-              <a:t>25/04/14</a:t>
+              <a:t>30/04/14</a:t>
             </a:fld>
             <a:endParaRPr lang="en-US"/>
           </a:p>
@@ -3827,7 +3829,7 @@
           <a:p>
             <a:fld id="{6BFECD78-3C8E-49F2-8FAB-59489D168ABB}" type="datetimeFigureOut">
               <a:rPr lang="en-US" smtClean="0"/>
-              <a:t>25/04/14</a:t>
+              <a:t>30/04/14</a:t>
             </a:fld>
             <a:endParaRPr lang="en-US"/>
           </a:p>
@@ -4104,7 +4106,7 @@
           <a:p>
             <a:fld id="{6BFECD78-3C8E-49F2-8FAB-59489D168ABB}" type="datetimeFigureOut">
               <a:rPr lang="en-US" smtClean="0"/>
-              <a:t>25/04/14</a:t>
+              <a:t>30/04/14</a:t>
             </a:fld>
             <a:endParaRPr lang="en-US"/>
           </a:p>
@@ -4361,7 +4363,7 @@
           <a:p>
             <a:fld id="{6BFECD78-3C8E-49F2-8FAB-59489D168ABB}" type="datetimeFigureOut">
               <a:rPr lang="en-US" smtClean="0"/>
-              <a:t>25/04/14</a:t>
+              <a:t>30/04/14</a:t>
             </a:fld>
             <a:endParaRPr lang="en-US"/>
           </a:p>
@@ -4574,7 +4576,7 @@
           <a:p>
             <a:fld id="{6BFECD78-3C8E-49F2-8FAB-59489D168ABB}" type="datetimeFigureOut">
               <a:rPr lang="en-US" smtClean="0"/>
-              <a:t>25/04/14</a:t>
+              <a:t>30/04/14</a:t>
             </a:fld>
             <a:endParaRPr lang="en-US"/>
           </a:p>
@@ -5099,11 +5101,7 @@
           <a:p>
             <a:r>
               <a:rPr lang="en-US" dirty="0" smtClean="0"/>
-              <a:t>Non-executable </a:t>
-            </a:r>
-            <a:r>
-              <a:rPr lang="en-US" dirty="0" smtClean="0"/>
-              <a:t>stack</a:t>
+              <a:t>Non-executable stack</a:t>
             </a:r>
           </a:p>
           <a:p>
@@ -5117,22 +5115,12 @@
               <a:rPr lang="en-US" dirty="0" smtClean="0"/>
               <a:t>Stack canaries</a:t>
             </a:r>
-            <a:endParaRPr lang="en-US" dirty="0" smtClean="0"/>
-          </a:p>
-          <a:p>
-            <a:r>
-              <a:rPr lang="en-US" dirty="0" smtClean="0"/>
-              <a:t>ASLR </a:t>
-            </a:r>
-            <a:r>
-              <a:rPr lang="en-US" dirty="0" smtClean="0"/>
-              <a:t>(Address Space Layout Randomization</a:t>
-            </a:r>
-            <a:r>
-              <a:rPr lang="en-US" dirty="0" smtClean="0"/>
-              <a:t>)</a:t>
-            </a:r>
-            <a:endParaRPr lang="en-US" dirty="0" smtClean="0"/>
+          </a:p>
+          <a:p>
+            <a:r>
+              <a:rPr lang="en-US" dirty="0" smtClean="0"/>
+              <a:t>ASLR (Address Space Layout Randomization)</a:t>
+            </a:r>
           </a:p>
         </p:txBody>
       </p:sp>
@@ -5190,11 +5178,7 @@
           <a:p>
             <a:r>
               <a:rPr lang="en-US" dirty="0" smtClean="0"/>
-              <a:t>Bypassing </a:t>
-            </a:r>
-            <a:r>
-              <a:rPr lang="en-US" dirty="0" smtClean="0"/>
-              <a:t>mitigations</a:t>
+              <a:t>Bypassing mitigations</a:t>
             </a:r>
             <a:endParaRPr lang="en-US" dirty="0"/>
           </a:p>
@@ -5231,11 +5215,7 @@
             <a:pPr lvl="1"/>
             <a:r>
               <a:rPr lang="en-US" dirty="0" smtClean="0"/>
-              <a:t>Return</a:t>
-            </a:r>
-            <a:r>
-              <a:rPr lang="en-US" dirty="0" smtClean="0"/>
-              <a:t>-to-</a:t>
+              <a:t>Return-to-</a:t>
             </a:r>
             <a:r>
               <a:rPr lang="en-US" dirty="0" err="1" smtClean="0"/>
@@ -5245,7 +5225,6 @@
               <a:rPr lang="en-US" dirty="0" smtClean="0"/>
               <a:t> / ROP</a:t>
             </a:r>
-            <a:endParaRPr lang="en-US" dirty="0" smtClean="0"/>
           </a:p>
           <a:p>
             <a:r>
@@ -5257,26 +5236,14 @@
             <a:pPr lvl="1"/>
             <a:r>
               <a:rPr lang="en-US" dirty="0" smtClean="0"/>
-              <a:t>An info </a:t>
-            </a:r>
-            <a:r>
-              <a:rPr lang="en-US" dirty="0" smtClean="0"/>
-              <a:t>leak</a:t>
+              <a:t>An info leak</a:t>
             </a:r>
           </a:p>
           <a:p>
             <a:pPr lvl="1"/>
             <a:r>
               <a:rPr lang="en-US" dirty="0" smtClean="0"/>
-              <a:t>Overwrite </a:t>
-            </a:r>
-            <a:r>
-              <a:rPr lang="en-US" dirty="0" smtClean="0"/>
-              <a:t>the stack </a:t>
-            </a:r>
-            <a:r>
-              <a:rPr lang="en-US" dirty="0" smtClean="0"/>
-              <a:t>cookie</a:t>
+              <a:t>Overwrite the stack cookie</a:t>
             </a:r>
           </a:p>
           <a:p>
@@ -5289,7 +5256,6 @@
               <a:rPr lang="en-US" dirty="0" smtClean="0"/>
               <a:t>force</a:t>
             </a:r>
-            <a:endParaRPr lang="en-US" dirty="0" smtClean="0"/>
           </a:p>
           <a:p>
             <a:r>
@@ -5301,11 +5267,7 @@
             <a:pPr lvl="1"/>
             <a:r>
               <a:rPr lang="en-US" dirty="0" smtClean="0"/>
-              <a:t>Info leak (the relative addresses are the same</a:t>
-            </a:r>
-            <a:r>
-              <a:rPr lang="en-US" dirty="0" smtClean="0"/>
-              <a:t>)</a:t>
+              <a:t>Info leak (the relative addresses are the same)</a:t>
             </a:r>
           </a:p>
           <a:p>
@@ -5314,7 +5276,6 @@
               <a:rPr lang="en-US" dirty="0" smtClean="0"/>
               <a:t>Brute-force</a:t>
             </a:r>
-            <a:endParaRPr lang="en-US" dirty="0" smtClean="0"/>
           </a:p>
         </p:txBody>
       </p:sp>
@@ -5372,15 +5333,7 @@
           <a:p>
             <a:r>
               <a:rPr lang="en-US" dirty="0" smtClean="0"/>
-              <a:t>ROP </a:t>
-            </a:r>
-            <a:r>
-              <a:rPr lang="en-US" dirty="0" smtClean="0"/>
-              <a:t>challenges</a:t>
-            </a:r>
-            <a:r>
-              <a:rPr lang="en-US" dirty="0" smtClean="0"/>
-              <a:t>	</a:t>
+              <a:t>ROP challenges	</a:t>
             </a:r>
             <a:endParaRPr lang="en-US" dirty="0"/>
           </a:p>
@@ -5411,15 +5364,7 @@
             </a:r>
             <a:r>
               <a:rPr lang="en-US" dirty="0" smtClean="0"/>
-              <a:t> no </a:t>
-            </a:r>
-            <a:r>
-              <a:rPr lang="en-US" dirty="0" smtClean="0"/>
-              <a:t>NUL bytes may </a:t>
-            </a:r>
-            <a:r>
-              <a:rPr lang="en-US" dirty="0" smtClean="0"/>
-              <a:t>be present in the payload</a:t>
+              <a:t> no NUL bytes may be present in the payload</a:t>
             </a:r>
           </a:p>
           <a:p>
@@ -5454,17 +5399,8 @@
             </a:r>
             <a:r>
               <a:rPr lang="en-US" dirty="0" smtClean="0"/>
-              <a:t> </a:t>
-            </a:r>
-            <a:r>
-              <a:rPr lang="en-US" dirty="0" smtClean="0"/>
-              <a:t>in a gadget to create 0x00 </a:t>
-            </a:r>
-            <a:r>
-              <a:rPr lang="en-US" dirty="0" smtClean="0"/>
-              <a:t>bytes</a:t>
-            </a:r>
-            <a:endParaRPr lang="en-US" dirty="0" smtClean="0"/>
+              <a:t> in a gadget to create 0x00 bytes</a:t>
+            </a:r>
           </a:p>
           <a:p>
             <a:r>
@@ -5476,11 +5412,7 @@
             <a:pPr lvl="1"/>
             <a:r>
               <a:rPr lang="en-US" dirty="0" smtClean="0"/>
-              <a:t>Use a tool where you can filter on useful </a:t>
-            </a:r>
-            <a:r>
-              <a:rPr lang="en-US" dirty="0" smtClean="0"/>
-              <a:t>gadgets</a:t>
+              <a:t>Use a tool where you can filter on useful gadgets</a:t>
             </a:r>
           </a:p>
           <a:p>
@@ -6068,7 +6000,6 @@
               <a:rPr lang="en-US" dirty="0" smtClean="0"/>
               <a:t>Theoretically, one can perform ROP in a few different ways, but we will focus on buffer overflows</a:t>
             </a:r>
-            <a:endParaRPr lang="en-US" dirty="0" smtClean="0"/>
           </a:p>
           <a:p>
             <a:pPr marL="457200" lvl="1" indent="0">
@@ -6456,56 +6387,40 @@
           <a:chExt cx="0" cy="0"/>
         </a:xfrm>
       </p:grpSpPr>
-      <p:sp>
-        <p:nvSpPr>
-          <p:cNvPr id="2" name="Title 1"/>
-          <p:cNvSpPr>
-            <a:spLocks noGrp="1"/>
-          </p:cNvSpPr>
-          <p:nvPr>
-            <p:ph type="title"/>
-          </p:nvPr>
-        </p:nvSpPr>
-        <p:spPr/>
-        <p:txBody>
-          <a:bodyPr/>
-          <a:lstStyle/>
-          <a:p>
-            <a:r>
-              <a:rPr lang="en-US" dirty="0" smtClean="0"/>
-              <a:t>Demo time!	</a:t>
-            </a:r>
-            <a:endParaRPr lang="en-US" dirty="0"/>
-          </a:p>
-        </p:txBody>
-      </p:sp>
-      <p:sp>
-        <p:nvSpPr>
-          <p:cNvPr id="3" name="Content Placeholder 2"/>
-          <p:cNvSpPr>
-            <a:spLocks noGrp="1"/>
-          </p:cNvSpPr>
-          <p:nvPr>
-            <p:ph idx="1"/>
-          </p:nvPr>
-        </p:nvSpPr>
-        <p:spPr/>
-        <p:txBody>
-          <a:bodyPr/>
-          <a:lstStyle/>
-          <a:p>
-            <a:r>
-              <a:rPr lang="en-US" dirty="0" smtClean="0"/>
-              <a:t>Best case scenario</a:t>
-            </a:r>
-            <a:endParaRPr lang="en-US" dirty="0" smtClean="0"/>
-          </a:p>
-        </p:txBody>
-      </p:sp>
+      <p:pic>
+        <p:nvPicPr>
+          <p:cNvPr id="4" name="Picture 3" descr="next_pstring-pre.jpg"/>
+          <p:cNvPicPr>
+            <a:picLocks noChangeAspect="1"/>
+          </p:cNvPicPr>
+          <p:nvPr/>
+        </p:nvPicPr>
+        <p:blipFill>
+          <a:blip r:embed="rId2">
+            <a:extLst>
+              <a:ext uri="{28A0092B-C50C-407E-A947-70E740481C1C}">
+                <a14:useLocalDpi xmlns:a14="http://schemas.microsoft.com/office/drawing/2010/main" val="0"/>
+              </a:ext>
+            </a:extLst>
+          </a:blip>
+          <a:stretch>
+            <a:fillRect/>
+          </a:stretch>
+        </p:blipFill>
+        <p:spPr>
+          <a:xfrm>
+            <a:off x="0" y="0"/>
+            <a:ext cx="9114842" cy="6858000"/>
+          </a:xfrm>
+          <a:prstGeom prst="rect">
+            <a:avLst/>
+          </a:prstGeom>
+        </p:spPr>
+      </p:pic>
     </p:spTree>
     <p:extLst>
       <p:ext uri="{BB962C8B-B14F-4D97-AF65-F5344CB8AC3E}">
-        <p14:creationId xmlns:p14="http://schemas.microsoft.com/office/powerpoint/2010/main" val="1200082712"/>
+        <p14:creationId xmlns:p14="http://schemas.microsoft.com/office/powerpoint/2010/main" val="918965459"/>
       </p:ext>
     </p:extLst>
   </p:cSld>
@@ -6551,23 +6466,66 @@
         </p:nvSpPr>
         <p:spPr/>
         <p:txBody>
-          <a:bodyPr>
-            <a:normAutofit fontScale="90000"/>
-          </a:bodyPr>
-          <a:lstStyle/>
-          <a:p>
-            <a:r>
-              <a:rPr lang="en-US" dirty="0" smtClean="0"/>
-              <a:t>TODO: Fill in traditional stack overflow</a:t>
-            </a:r>
-            <a:endParaRPr lang="en-US" dirty="0"/>
-          </a:p>
-        </p:txBody>
-      </p:sp>
+          <a:bodyPr/>
+          <a:lstStyle/>
+          <a:p>
+            <a:endParaRPr lang="en-US"/>
+          </a:p>
+        </p:txBody>
+      </p:sp>
+      <p:sp>
+        <p:nvSpPr>
+          <p:cNvPr id="3" name="Content Placeholder 2"/>
+          <p:cNvSpPr>
+            <a:spLocks noGrp="1"/>
+          </p:cNvSpPr>
+          <p:nvPr>
+            <p:ph idx="1"/>
+          </p:nvPr>
+        </p:nvSpPr>
+        <p:spPr/>
+        <p:txBody>
+          <a:bodyPr/>
+          <a:lstStyle/>
+          <a:p>
+            <a:endParaRPr lang="en-US"/>
+          </a:p>
+        </p:txBody>
+      </p:sp>
+      <p:pic>
+        <p:nvPicPr>
+          <p:cNvPr id="4" name="Picture 3" descr="next_pstring-post.jpg"/>
+          <p:cNvPicPr>
+            <a:picLocks noChangeAspect="1"/>
+          </p:cNvPicPr>
+          <p:nvPr/>
+        </p:nvPicPr>
+        <p:blipFill>
+          <a:blip r:embed="rId2">
+            <a:extLst>
+              <a:ext uri="{28A0092B-C50C-407E-A947-70E740481C1C}">
+                <a14:useLocalDpi xmlns:a14="http://schemas.microsoft.com/office/drawing/2010/main" val="0"/>
+              </a:ext>
+            </a:extLst>
+          </a:blip>
+          <a:stretch>
+            <a:fillRect/>
+          </a:stretch>
+        </p:blipFill>
+        <p:spPr>
+          <a:xfrm>
+            <a:off x="0" y="0"/>
+            <a:ext cx="9114842" cy="6858000"/>
+          </a:xfrm>
+          <a:prstGeom prst="rect">
+            <a:avLst/>
+          </a:prstGeom>
+        </p:spPr>
+      </p:pic>
     </p:spTree>
     <p:extLst>
       <p:ext uri="{BB962C8B-B14F-4D97-AF65-F5344CB8AC3E}">
-        <p14:creationId xmlns:p14="http://schemas.microsoft.com/office/powerpoint/2010/main" val="3589637077"/>
+        <p14:creationId xmlns:p14="http://schemas.microsoft.com/office/powerpoint/2010/main" val="3244612477"/>
       </p:ext>
     </p:extLst>
   </p:cSld>
@@ -6641,89 +6599,15 @@
           <a:p>
             <a:r>
               <a:rPr lang="en-US" dirty="0" smtClean="0"/>
-              <a:t>Traditional stack overflow</a:t>
-            </a:r>
-          </a:p>
-          <a:p>
-            <a:pPr marL="0" indent="0">
-              <a:buNone/>
-            </a:pPr>
-            <a:endParaRPr lang="en-US" dirty="0" smtClean="0"/>
-          </a:p>
-          <a:p>
-            <a:pPr marL="457200" lvl="1" indent="0">
-              <a:buNone/>
-            </a:pPr>
-            <a:r>
-              <a:rPr lang="en-US" dirty="0" err="1"/>
-              <a:t>g</a:t>
-            </a:r>
-            <a:r>
-              <a:rPr lang="en-US" dirty="0" err="1" smtClean="0"/>
-              <a:t>cc</a:t>
-            </a:r>
-            <a:r>
-              <a:rPr lang="en-US" dirty="0" smtClean="0"/>
-              <a:t> -Wall –</a:t>
-            </a:r>
-            <a:r>
-              <a:rPr lang="en-US" dirty="0" err="1" smtClean="0"/>
-              <a:t>fno</a:t>
-            </a:r>
-            <a:r>
-              <a:rPr lang="en-US" dirty="0" smtClean="0"/>
-              <a:t>-stack-protector –z </a:t>
-            </a:r>
-            <a:r>
-              <a:rPr lang="en-US" dirty="0" err="1" smtClean="0"/>
-              <a:t>execstack</a:t>
-            </a:r>
-            <a:endParaRPr lang="en-US" dirty="0" smtClean="0"/>
-          </a:p>
-          <a:p>
-            <a:pPr marL="457200" lvl="1" indent="0">
-              <a:buNone/>
-            </a:pPr>
-            <a:endParaRPr lang="en-US" dirty="0" smtClean="0"/>
-          </a:p>
-          <a:p>
-            <a:pPr marL="457200" lvl="1" indent="0">
-              <a:buNone/>
-            </a:pPr>
-            <a:r>
-              <a:rPr lang="en-US" dirty="0" err="1"/>
-              <a:t>gcc</a:t>
-            </a:r>
-            <a:r>
-              <a:rPr lang="en-US" dirty="0"/>
-              <a:t> -Wall –</a:t>
-            </a:r>
-            <a:r>
-              <a:rPr lang="en-US" dirty="0" err="1"/>
-              <a:t>fno</a:t>
-            </a:r>
-            <a:r>
-              <a:rPr lang="en-US" dirty="0"/>
-              <a:t>-stack-</a:t>
-            </a:r>
-            <a:r>
-              <a:rPr lang="en-US" dirty="0" smtClean="0"/>
-              <a:t>protector</a:t>
-            </a:r>
-            <a:endParaRPr lang="en-US" dirty="0"/>
-          </a:p>
-          <a:p>
-            <a:pPr marL="457200" lvl="1" indent="0">
-              <a:buNone/>
-            </a:pPr>
-            <a:endParaRPr lang="en-US" dirty="0" smtClean="0"/>
+              <a:t>Best case scenario</a:t>
+            </a:r>
           </a:p>
         </p:txBody>
       </p:sp>
     </p:spTree>
     <p:extLst>
       <p:ext uri="{BB962C8B-B14F-4D97-AF65-F5344CB8AC3E}">
-        <p14:creationId xmlns:p14="http://schemas.microsoft.com/office/powerpoint/2010/main" val="363628969"/>
+        <p14:creationId xmlns:p14="http://schemas.microsoft.com/office/powerpoint/2010/main" val="1200082712"/>
       </p:ext>
     </p:extLst>
   </p:cSld>
@@ -6770,13 +6654,13 @@
         <p:spPr/>
         <p:txBody>
           <a:bodyPr>
-            <a:normAutofit/>
+            <a:normAutofit fontScale="90000"/>
           </a:bodyPr>
           <a:lstStyle/>
           <a:p>
             <a:r>
               <a:rPr lang="en-US" dirty="0" smtClean="0"/>
-              <a:t>TODO: Fill in ROP</a:t>
+              <a:t>TODO: Fill in traditional stack overflow</a:t>
             </a:r>
             <a:endParaRPr lang="en-US" dirty="0"/>
           </a:p>
@@ -6785,13 +6669,20 @@
     </p:spTree>
     <p:extLst>
       <p:ext uri="{BB962C8B-B14F-4D97-AF65-F5344CB8AC3E}">
-        <p14:creationId xmlns:p14="http://schemas.microsoft.com/office/powerpoint/2010/main" val="318503199"/>
+        <p14:creationId xmlns:p14="http://schemas.microsoft.com/office/powerpoint/2010/main" val="3589637077"/>
       </p:ext>
     </p:extLst>
   </p:cSld>
   <p:clrMapOvr>
     <a:masterClrMapping/>
   </p:clrMapOvr>
+  <p:timing>
+    <p:tnLst>
+      <p:par>
+        <p:cTn xmlns:p14="http://schemas.microsoft.com/office/powerpoint/2010/main" id="1" dur="indefinite" restart="never" nodeType="tmRoot"/>
+      </p:par>
+    </p:tnLst>
+  </p:timing>
 </p:sld>
 </file>
 
@@ -6852,8 +6743,14 @@
           <a:p>
             <a:r>
               <a:rPr lang="en-US" dirty="0" smtClean="0"/>
-              <a:t>ROP</a:t>
-            </a:r>
+              <a:t>Traditional stack overflow</a:t>
+            </a:r>
+          </a:p>
+          <a:p>
+            <a:pPr marL="0" indent="0">
+              <a:buNone/>
+            </a:pPr>
+            <a:endParaRPr lang="en-US" dirty="0" smtClean="0"/>
           </a:p>
           <a:p>
             <a:pPr marL="457200" lvl="1" indent="0">
@@ -6869,7 +6766,7 @@
             </a:r>
             <a:r>
               <a:rPr lang="en-US" dirty="0" smtClean="0"/>
-              <a:t> –Wall –</a:t>
+              <a:t> -Wall –</a:t>
             </a:r>
             <a:r>
               <a:rPr lang="en-US" dirty="0" err="1" smtClean="0"/>
@@ -6877,8 +6774,50 @@
             </a:r>
             <a:r>
               <a:rPr lang="en-US" dirty="0" smtClean="0"/>
-              <a:t>-stack-protector</a:t>
-            </a:r>
+              <a:t>-stack-protector –z </a:t>
+            </a:r>
+            <a:r>
+              <a:rPr lang="en-US" dirty="0" err="1" smtClean="0"/>
+              <a:t>execstack</a:t>
+            </a:r>
+            <a:endParaRPr lang="en-US" dirty="0" smtClean="0"/>
+          </a:p>
+          <a:p>
+            <a:pPr marL="457200" lvl="1" indent="0">
+              <a:buNone/>
+            </a:pPr>
+            <a:endParaRPr lang="en-US" dirty="0" smtClean="0"/>
+          </a:p>
+          <a:p>
+            <a:pPr marL="457200" lvl="1" indent="0">
+              <a:buNone/>
+            </a:pPr>
+            <a:r>
+              <a:rPr lang="en-US" dirty="0" err="1"/>
+              <a:t>gcc</a:t>
+            </a:r>
+            <a:r>
+              <a:rPr lang="en-US" dirty="0"/>
+              <a:t> -Wall –</a:t>
+            </a:r>
+            <a:r>
+              <a:rPr lang="en-US" dirty="0" err="1"/>
+              <a:t>fno</a:t>
+            </a:r>
+            <a:r>
+              <a:rPr lang="en-US" dirty="0"/>
+              <a:t>-stack-</a:t>
+            </a:r>
+            <a:r>
+              <a:rPr lang="en-US" dirty="0" smtClean="0"/>
+              <a:t>protector</a:t>
+            </a:r>
+            <a:endParaRPr lang="en-US" dirty="0"/>
+          </a:p>
+          <a:p>
+            <a:pPr marL="457200" lvl="1" indent="0">
+              <a:buNone/>
+            </a:pPr>
             <a:endParaRPr lang="en-US" dirty="0" smtClean="0"/>
           </a:p>
         </p:txBody>
@@ -6886,7 +6825,7 @@
     </p:spTree>
     <p:extLst>
       <p:ext uri="{BB962C8B-B14F-4D97-AF65-F5344CB8AC3E}">
-        <p14:creationId xmlns:p14="http://schemas.microsoft.com/office/powerpoint/2010/main" val="2850226909"/>
+        <p14:creationId xmlns:p14="http://schemas.microsoft.com/office/powerpoint/2010/main" val="363628969"/>
       </p:ext>
     </p:extLst>
   </p:cSld>
@@ -7021,6 +6960,168 @@
         </p:nvSpPr>
         <p:spPr/>
         <p:txBody>
+          <a:bodyPr>
+            <a:normAutofit/>
+          </a:bodyPr>
+          <a:lstStyle/>
+          <a:p>
+            <a:r>
+              <a:rPr lang="en-US" dirty="0" smtClean="0"/>
+              <a:t>TODO: Fill in ROP</a:t>
+            </a:r>
+            <a:endParaRPr lang="en-US" dirty="0"/>
+          </a:p>
+        </p:txBody>
+      </p:sp>
+    </p:spTree>
+    <p:extLst>
+      <p:ext uri="{BB962C8B-B14F-4D97-AF65-F5344CB8AC3E}">
+        <p14:creationId xmlns:p14="http://schemas.microsoft.com/office/powerpoint/2010/main" val="318503199"/>
+      </p:ext>
+    </p:extLst>
+  </p:cSld>
+  <p:clrMapOvr>
+    <a:masterClrMapping/>
+  </p:clrMapOvr>
+</p:sld>
+</file>
+
+<file path=ppt/slides/slide31.xml><?xml version="1.0" encoding="utf-8"?>
+<p:sld xmlns:a="http://schemas.openxmlformats.org/drawingml/2006/main" xmlns:r="http://schemas.openxmlformats.org/officeDocument/2006/relationships" xmlns:p="http://schemas.openxmlformats.org/presentationml/2006/main">
+  <p:cSld>
+    <p:spTree>
+      <p:nvGrpSpPr>
+        <p:cNvPr id="1" name=""/>
+        <p:cNvGrpSpPr/>
+        <p:nvPr/>
+      </p:nvGrpSpPr>
+      <p:grpSpPr>
+        <a:xfrm>
+          <a:off x="0" y="0"/>
+          <a:ext cx="0" cy="0"/>
+          <a:chOff x="0" y="0"/>
+          <a:chExt cx="0" cy="0"/>
+        </a:xfrm>
+      </p:grpSpPr>
+      <p:sp>
+        <p:nvSpPr>
+          <p:cNvPr id="2" name="Title 1"/>
+          <p:cNvSpPr>
+            <a:spLocks noGrp="1"/>
+          </p:cNvSpPr>
+          <p:nvPr>
+            <p:ph type="title"/>
+          </p:nvPr>
+        </p:nvSpPr>
+        <p:spPr/>
+        <p:txBody>
+          <a:bodyPr/>
+          <a:lstStyle/>
+          <a:p>
+            <a:r>
+              <a:rPr lang="en-US" dirty="0" smtClean="0"/>
+              <a:t>Demo time!	</a:t>
+            </a:r>
+            <a:endParaRPr lang="en-US" dirty="0"/>
+          </a:p>
+        </p:txBody>
+      </p:sp>
+      <p:sp>
+        <p:nvSpPr>
+          <p:cNvPr id="3" name="Content Placeholder 2"/>
+          <p:cNvSpPr>
+            <a:spLocks noGrp="1"/>
+          </p:cNvSpPr>
+          <p:nvPr>
+            <p:ph idx="1"/>
+          </p:nvPr>
+        </p:nvSpPr>
+        <p:spPr/>
+        <p:txBody>
+          <a:bodyPr/>
+          <a:lstStyle/>
+          <a:p>
+            <a:r>
+              <a:rPr lang="en-US" dirty="0" smtClean="0"/>
+              <a:t>ROP</a:t>
+            </a:r>
+          </a:p>
+          <a:p>
+            <a:pPr marL="457200" lvl="1" indent="0">
+              <a:buNone/>
+            </a:pPr>
+            <a:r>
+              <a:rPr lang="en-US" dirty="0" err="1"/>
+              <a:t>g</a:t>
+            </a:r>
+            <a:r>
+              <a:rPr lang="en-US" dirty="0" err="1" smtClean="0"/>
+              <a:t>cc</a:t>
+            </a:r>
+            <a:r>
+              <a:rPr lang="en-US" dirty="0" smtClean="0"/>
+              <a:t> –Wall –</a:t>
+            </a:r>
+            <a:r>
+              <a:rPr lang="en-US" dirty="0" err="1" smtClean="0"/>
+              <a:t>fno</a:t>
+            </a:r>
+            <a:r>
+              <a:rPr lang="en-US" dirty="0" smtClean="0"/>
+              <a:t>-stack-protector</a:t>
+            </a:r>
+          </a:p>
+        </p:txBody>
+      </p:sp>
+    </p:spTree>
+    <p:extLst>
+      <p:ext uri="{BB962C8B-B14F-4D97-AF65-F5344CB8AC3E}">
+        <p14:creationId xmlns:p14="http://schemas.microsoft.com/office/powerpoint/2010/main" val="2850226909"/>
+      </p:ext>
+    </p:extLst>
+  </p:cSld>
+  <p:clrMapOvr>
+    <a:masterClrMapping/>
+  </p:clrMapOvr>
+  <p:timing>
+    <p:tnLst>
+      <p:par>
+        <p:cTn xmlns:p14="http://schemas.microsoft.com/office/powerpoint/2010/main" id="1" dur="indefinite" restart="never" nodeType="tmRoot"/>
+      </p:par>
+    </p:tnLst>
+  </p:timing>
+</p:sld>
+</file>
+
+<file path=ppt/slides/slide32.xml><?xml version="1.0" encoding="utf-8"?>
+<p:sld xmlns:a="http://schemas.openxmlformats.org/drawingml/2006/main" xmlns:r="http://schemas.openxmlformats.org/officeDocument/2006/relationships" xmlns:p="http://schemas.openxmlformats.org/presentationml/2006/main">
+  <p:cSld>
+    <p:spTree>
+      <p:nvGrpSpPr>
+        <p:cNvPr id="1" name=""/>
+        <p:cNvGrpSpPr/>
+        <p:nvPr/>
+      </p:nvGrpSpPr>
+      <p:grpSpPr>
+        <a:xfrm>
+          <a:off x="0" y="0"/>
+          <a:ext cx="0" cy="0"/>
+          <a:chOff x="0" y="0"/>
+          <a:chExt cx="0" cy="0"/>
+        </a:xfrm>
+      </p:grpSpPr>
+      <p:sp>
+        <p:nvSpPr>
+          <p:cNvPr id="2" name="Title 1"/>
+          <p:cNvSpPr>
+            <a:spLocks noGrp="1"/>
+          </p:cNvSpPr>
+          <p:nvPr>
+            <p:ph type="title"/>
+          </p:nvPr>
+        </p:nvSpPr>
+        <p:spPr/>
+        <p:txBody>
           <a:bodyPr/>
           <a:lstStyle/>
           <a:p>
@@ -7071,11 +7172,7 @@
             </a:r>
             <a:r>
               <a:rPr lang="en-US" dirty="0" smtClean="0"/>
-              <a:t> </a:t>
-            </a:r>
-            <a:r>
-              <a:rPr lang="en-US" dirty="0" smtClean="0"/>
-              <a:t>– </a:t>
+              <a:t> – </a:t>
             </a:r>
             <a:r>
               <a:rPr lang="en-US" dirty="0" err="1" smtClean="0"/>
@@ -7099,14 +7196,12 @@
               <a:rPr lang="en-US" dirty="0" smtClean="0"/>
               <a:t>ROP payload compiler</a:t>
             </a:r>
-            <a:endParaRPr lang="en-US" dirty="0" smtClean="0"/>
           </a:p>
           <a:p>
             <a:r>
               <a:rPr lang="en-US" dirty="0" smtClean="0"/>
               <a:t>A plethora of other tools</a:t>
             </a:r>
-            <a:endParaRPr lang="en-US" dirty="0" smtClean="0"/>
           </a:p>
         </p:txBody>
       </p:sp>
@@ -7130,7 +7225,7 @@
 </p:sld>
 </file>
 
-<file path=ppt/slides/slide31.xml><?xml version="1.0" encoding="utf-8"?>
+<file path=ppt/slides/slide33.xml><?xml version="1.0" encoding="utf-8"?>
 <p:sld xmlns:a="http://schemas.openxmlformats.org/drawingml/2006/main" xmlns:r="http://schemas.openxmlformats.org/officeDocument/2006/relationships" xmlns:p="http://schemas.openxmlformats.org/presentationml/2006/main">
   <p:cSld>
     <p:spTree>
@@ -7311,11 +7406,7 @@
           <a:p>
             <a:r>
               <a:rPr lang="en-US" dirty="0" smtClean="0"/>
-              <a:t>History of </a:t>
-            </a:r>
-            <a:r>
-              <a:rPr lang="en-US" dirty="0" smtClean="0"/>
-              <a:t>buffer overflow exploitation</a:t>
+              <a:t>History of buffer overflow exploitation</a:t>
             </a:r>
             <a:endParaRPr lang="en-US" dirty="0"/>
           </a:p>
@@ -7338,11 +7429,7 @@
           <a:p>
             <a:r>
               <a:rPr lang="en-US" dirty="0" smtClean="0"/>
-              <a:t>Paper published documenting it in </a:t>
-            </a:r>
-            <a:r>
-              <a:rPr lang="en-US" dirty="0" smtClean="0"/>
-              <a:t>‘72</a:t>
+              <a:t>Paper published documenting it in ‘72</a:t>
             </a:r>
           </a:p>
           <a:p>
@@ -7450,11 +7537,7 @@
           <a:p>
             <a:r>
               <a:rPr lang="en-US" dirty="0" smtClean="0"/>
-              <a:t>Evolution: </a:t>
-            </a:r>
-            <a:r>
-              <a:rPr lang="en-US" dirty="0" smtClean="0"/>
-              <a:t>then</a:t>
+              <a:t>Evolution: then</a:t>
             </a:r>
             <a:endParaRPr lang="en-US" dirty="0"/>
           </a:p>
@@ -7479,11 +7562,7 @@
           <a:p>
             <a:r>
               <a:rPr lang="en-US" dirty="0" smtClean="0"/>
-              <a:t>Traditional stack </a:t>
-            </a:r>
-            <a:r>
-              <a:rPr lang="en-US" dirty="0" smtClean="0"/>
-              <a:t>overflow</a:t>
+              <a:t>Traditional stack overflow</a:t>
             </a:r>
           </a:p>
           <a:p>
@@ -7514,63 +7593,14 @@
             </a:r>
             <a:r>
               <a:rPr lang="en-US" dirty="0" smtClean="0"/>
-              <a:t> is </a:t>
-            </a:r>
-            <a:r>
-              <a:rPr lang="en-US" dirty="0" smtClean="0"/>
-              <a:t>performed </a:t>
-            </a:r>
-            <a:r>
-              <a:rPr lang="en-US" dirty="0" smtClean="0"/>
-              <a:t>the attacker controls the </a:t>
-            </a:r>
-            <a:r>
-              <a:rPr lang="en-US" dirty="0" smtClean="0"/>
-              <a:t>address and can point that at </a:t>
-            </a:r>
-            <a:r>
-              <a:rPr lang="en-US" dirty="0" smtClean="0"/>
-              <a:t>her </a:t>
-            </a:r>
-            <a:r>
-              <a:rPr lang="en-US" dirty="0" smtClean="0"/>
-              <a:t>own payload</a:t>
-            </a:r>
-            <a:endParaRPr lang="en-US" dirty="0" smtClean="0"/>
+              <a:t> is performed the attacker controls the address and can point that at her own payload</a:t>
+            </a:r>
           </a:p>
           <a:p>
             <a:pPr lvl="1"/>
             <a:r>
               <a:rPr lang="en-US" dirty="0" smtClean="0"/>
-              <a:t>If </a:t>
-            </a:r>
-            <a:r>
-              <a:rPr lang="en-US" dirty="0" smtClean="0"/>
-              <a:t>the attacker doesn’t</a:t>
-            </a:r>
-            <a:r>
-              <a:rPr lang="en-US" dirty="0" smtClean="0"/>
-              <a:t> exactly know </a:t>
-            </a:r>
-            <a:r>
-              <a:rPr lang="en-US" dirty="0" smtClean="0"/>
-              <a:t>which address the </a:t>
-            </a:r>
-            <a:r>
-              <a:rPr lang="en-US" dirty="0" smtClean="0"/>
-              <a:t>payload starts </a:t>
-            </a:r>
-            <a:r>
-              <a:rPr lang="en-US" dirty="0" smtClean="0"/>
-              <a:t>at, </a:t>
-            </a:r>
-            <a:r>
-              <a:rPr lang="en-US" dirty="0" smtClean="0"/>
-              <a:t>she </a:t>
-            </a:r>
-            <a:r>
-              <a:rPr lang="en-US" dirty="0" smtClean="0"/>
-              <a:t>can use a </a:t>
+              <a:t>If the attacker doesn’t exactly know which address the payload starts at, she can use a </a:t>
             </a:r>
             <a:r>
               <a:rPr lang="en-US" dirty="0" smtClean="0">
@@ -7580,25 +7610,8 @@
             </a:r>
             <a:r>
               <a:rPr lang="en-US" dirty="0" smtClean="0"/>
-              <a:t> </a:t>
-            </a:r>
-            <a:r>
-              <a:rPr lang="en-US" dirty="0" smtClean="0"/>
-              <a:t>sled to maximize </a:t>
-            </a:r>
-            <a:r>
-              <a:rPr lang="en-US" dirty="0" smtClean="0"/>
-              <a:t>her </a:t>
-            </a:r>
-            <a:r>
-              <a:rPr lang="en-US" dirty="0" smtClean="0"/>
-              <a:t>chances of </a:t>
-            </a:r>
-            <a:r>
-              <a:rPr lang="en-US" dirty="0" smtClean="0"/>
-              <a:t>successful exploitation</a:t>
-            </a:r>
-            <a:endParaRPr lang="en-US" dirty="0" smtClean="0"/>
+              <a:t> sled to maximize her chances of successful exploitation</a:t>
+            </a:r>
           </a:p>
         </p:txBody>
       </p:sp>
@@ -7689,13 +7702,8 @@
             </a:r>
             <a:r>
               <a:rPr lang="en-US" dirty="0" smtClean="0"/>
-              <a:t> </a:t>
-            </a:r>
-            <a:r>
-              <a:rPr lang="en-US" dirty="0" smtClean="0"/>
-              <a:t>attack</a:t>
-            </a:r>
-            <a:endParaRPr lang="en-US" dirty="0" smtClean="0"/>
+              <a:t> attack</a:t>
+            </a:r>
           </a:p>
           <a:p>
             <a:pPr lvl="1"/>
@@ -7735,55 +7743,14 @@
             </a:r>
             <a:r>
               <a:rPr lang="en-US" dirty="0" smtClean="0"/>
-              <a:t> is performed </a:t>
-            </a:r>
-            <a:r>
-              <a:rPr lang="en-US" dirty="0" smtClean="0"/>
-              <a:t>the attacker controls </a:t>
-            </a:r>
-            <a:r>
-              <a:rPr lang="en-US" dirty="0" smtClean="0"/>
-              <a:t>the address </a:t>
-            </a:r>
-            <a:r>
-              <a:rPr lang="en-US" dirty="0" smtClean="0"/>
-              <a:t>(</a:t>
-            </a:r>
-            <a:r>
-              <a:rPr lang="en-US" dirty="0" smtClean="0"/>
-              <a:t>e.g. </a:t>
-            </a:r>
-            <a:r>
-              <a:rPr lang="en-US" dirty="0" smtClean="0"/>
-              <a:t>the system() function call)</a:t>
-            </a:r>
-            <a:endParaRPr lang="en-US" dirty="0" smtClean="0"/>
+              <a:t> is performed the attacker controls the address (e.g. the system() function call)</a:t>
+            </a:r>
           </a:p>
           <a:p>
             <a:pPr lvl="1"/>
             <a:r>
               <a:rPr lang="en-US" dirty="0" smtClean="0"/>
-              <a:t>She </a:t>
-            </a:r>
-            <a:r>
-              <a:rPr lang="en-US" dirty="0" smtClean="0"/>
-              <a:t>can write </a:t>
-            </a:r>
-            <a:r>
-              <a:rPr lang="en-US" dirty="0" smtClean="0"/>
-              <a:t>her </a:t>
-            </a:r>
-            <a:r>
-              <a:rPr lang="en-US" dirty="0" smtClean="0"/>
-              <a:t>own stack frame data beyond the ret address: (e.g</a:t>
-            </a:r>
-            <a:r>
-              <a:rPr lang="en-US" dirty="0" smtClean="0"/>
-              <a:t>. pointer to </a:t>
-            </a:r>
-            <a:r>
-              <a:rPr lang="en-US" dirty="0" smtClean="0"/>
-              <a:t>“/bin/</a:t>
+              <a:t>She can write her own stack frame data beyond the ret address: (e.g. pointer to “/bin/</a:t>
             </a:r>
             <a:r>
               <a:rPr lang="en-US" dirty="0" err="1" smtClean="0"/>
@@ -7791,11 +7758,7 @@
             </a:r>
             <a:r>
               <a:rPr lang="en-US" dirty="0" smtClean="0"/>
-              <a:t>”</a:t>
-            </a:r>
-            <a:r>
-              <a:rPr lang="en-US" dirty="0" smtClean="0"/>
-              <a:t>)</a:t>
+              <a:t>”)</a:t>
             </a:r>
           </a:p>
           <a:p>
@@ -7804,7 +7767,6 @@
               <a:rPr lang="en-US" dirty="0" smtClean="0"/>
               <a:t>Limited to one function call (which might not be enough in all cases)</a:t>
             </a:r>
-            <a:endParaRPr lang="en-US" dirty="0" smtClean="0"/>
           </a:p>
         </p:txBody>
       </p:sp>
@@ -7915,23 +7877,7 @@
             <a:pPr lvl="1"/>
             <a:r>
               <a:rPr lang="en-US" dirty="0" smtClean="0"/>
-              <a:t>Chain together </a:t>
-            </a:r>
-            <a:r>
-              <a:rPr lang="en-US" dirty="0" smtClean="0"/>
-              <a:t>addresses </a:t>
-            </a:r>
-            <a:r>
-              <a:rPr lang="en-US" dirty="0" smtClean="0"/>
-              <a:t>with </a:t>
-            </a:r>
-            <a:r>
-              <a:rPr lang="en-US" dirty="0" smtClean="0"/>
-              <a:t>instructions ending </a:t>
-            </a:r>
-            <a:r>
-              <a:rPr lang="en-US" dirty="0" smtClean="0"/>
-              <a:t>in </a:t>
+              <a:t>Chain together addresses with instructions ending in </a:t>
             </a:r>
             <a:r>
               <a:rPr lang="en-US" dirty="0" smtClean="0">
@@ -7952,11 +7898,7 @@
             </a:r>
             <a:r>
               <a:rPr lang="en-US" dirty="0" smtClean="0"/>
-              <a:t>The hard part is finding suitable </a:t>
-            </a:r>
-            <a:r>
-              <a:rPr lang="en-US" dirty="0" smtClean="0"/>
-              <a:t>gadgets and where they are mapped in the address space</a:t>
+              <a:t>The hard part is finding suitable gadgets and where they are mapped in the address space</a:t>
             </a:r>
           </a:p>
         </p:txBody>
@@ -8069,11 +8011,7 @@
           <a:p>
             <a:r>
               <a:rPr lang="en-US" dirty="0" smtClean="0"/>
-              <a:t>Return-to</a:t>
-            </a:r>
-            <a:r>
-              <a:rPr lang="en-US" dirty="0" smtClean="0"/>
-              <a:t>-</a:t>
+              <a:t>Return-to-</a:t>
             </a:r>
             <a:r>
               <a:rPr lang="en-US" dirty="0" err="1" smtClean="0"/>
@@ -8083,7 +8021,6 @@
               <a:rPr lang="en-US" dirty="0" smtClean="0"/>
               <a:t> attack</a:t>
             </a:r>
-            <a:endParaRPr lang="en-US" dirty="0" smtClean="0"/>
           </a:p>
           <a:p>
             <a:r>
@@ -8261,11 +8198,7 @@
           <a:p>
             <a:r>
               <a:rPr lang="en-US" dirty="0" smtClean="0"/>
-              <a:t>Non-executable </a:t>
-            </a:r>
-            <a:r>
-              <a:rPr lang="en-US" dirty="0" smtClean="0"/>
-              <a:t>stack (DEP)</a:t>
+              <a:t>Non-executable stack (DEP)</a:t>
             </a:r>
           </a:p>
           <a:p>
@@ -8283,11 +8216,7 @@
           <a:p>
             <a:r>
               <a:rPr lang="en-US" dirty="0" smtClean="0"/>
-              <a:t>Stack </a:t>
-            </a:r>
-            <a:r>
-              <a:rPr lang="en-US" dirty="0" smtClean="0"/>
-              <a:t>canaries</a:t>
+              <a:t>Stack canaries</a:t>
             </a:r>
           </a:p>
           <a:p>

</xml_diff>